<commit_message>
Changed requirements style, changed WinForms logo to WPF logo
</commit_message>
<xml_diff>
--- a/documents/Presentation.pptx
+++ b/documents/Presentation.pptx
@@ -154,7 +154,7 @@
                 <a16:creationId xmlns:a16="http://schemas.microsoft.com/office/drawing/2014/main" id="{48D7368D-31D9-8101-473D-CD39E706FD22}"/>
               </a:ext>
               <a:ext uri="{C183D7F6-B498-43B3-948B-1728B52AA6E4}">
-                <adec:decorative xmlns:adec="http://schemas.microsoft.com/office/drawing/2017/decorative" val="1"/>
+                <adec:decorative xmlns:adec="http://schemas.microsoft.com/office/drawing/2017/decorative" xmlns="" val="1"/>
               </a:ext>
             </a:extLst>
           </p:cNvPr>
@@ -442,7 +442,7 @@
           <a:p>
             <a:fld id="{1E351CED-465B-40B5-ADCE-957C918F227B}" type="datetimeFigureOut">
               <a:rPr lang="en-US" smtClean="0"/>
-              <a:t>9/14/2023</a:t>
+              <a:t>10/8/2023</a:t>
             </a:fld>
             <a:endParaRPr lang="en-US"/>
           </a:p>
@@ -650,7 +650,7 @@
           <a:p>
             <a:fld id="{1E351CED-465B-40B5-ADCE-957C918F227B}" type="datetimeFigureOut">
               <a:rPr lang="en-US" smtClean="0"/>
-              <a:t>9/14/2023</a:t>
+              <a:t>10/8/2023</a:t>
             </a:fld>
             <a:endParaRPr lang="en-US"/>
           </a:p>
@@ -860,7 +860,7 @@
           <a:p>
             <a:fld id="{1E351CED-465B-40B5-ADCE-957C918F227B}" type="datetimeFigureOut">
               <a:rPr lang="en-US" smtClean="0"/>
-              <a:t>9/14/2023</a:t>
+              <a:t>10/8/2023</a:t>
             </a:fld>
             <a:endParaRPr lang="en-US"/>
           </a:p>
@@ -1060,7 +1060,7 @@
           <a:p>
             <a:fld id="{1E351CED-465B-40B5-ADCE-957C918F227B}" type="datetimeFigureOut">
               <a:rPr lang="en-US" smtClean="0"/>
-              <a:t>9/14/2023</a:t>
+              <a:t>10/8/2023</a:t>
             </a:fld>
             <a:endParaRPr lang="en-US"/>
           </a:p>
@@ -1638,7 +1638,7 @@
           <a:p>
             <a:fld id="{1E351CED-465B-40B5-ADCE-957C918F227B}" type="datetimeFigureOut">
               <a:rPr lang="en-US" smtClean="0"/>
-              <a:t>9/14/2023</a:t>
+              <a:t>10/8/2023</a:t>
             </a:fld>
             <a:endParaRPr lang="en-US"/>
           </a:p>
@@ -1911,7 +1911,7 @@
           <a:p>
             <a:fld id="{1E351CED-465B-40B5-ADCE-957C918F227B}" type="datetimeFigureOut">
               <a:rPr lang="en-US" smtClean="0"/>
-              <a:t>9/14/2023</a:t>
+              <a:t>10/8/2023</a:t>
             </a:fld>
             <a:endParaRPr lang="en-US"/>
           </a:p>
@@ -2328,7 +2328,7 @@
           <a:p>
             <a:fld id="{1E351CED-465B-40B5-ADCE-957C918F227B}" type="datetimeFigureOut">
               <a:rPr lang="en-US" smtClean="0"/>
-              <a:t>9/14/2023</a:t>
+              <a:t>10/8/2023</a:t>
             </a:fld>
             <a:endParaRPr lang="en-US"/>
           </a:p>
@@ -2475,7 +2475,7 @@
           <a:p>
             <a:fld id="{1E351CED-465B-40B5-ADCE-957C918F227B}" type="datetimeFigureOut">
               <a:rPr lang="en-US" smtClean="0"/>
-              <a:t>9/14/2023</a:t>
+              <a:t>10/8/2023</a:t>
             </a:fld>
             <a:endParaRPr lang="en-US"/>
           </a:p>
@@ -2588,7 +2588,7 @@
           <a:p>
             <a:fld id="{1E351CED-465B-40B5-ADCE-957C918F227B}" type="datetimeFigureOut">
               <a:rPr lang="en-US" smtClean="0"/>
-              <a:t>9/14/2023</a:t>
+              <a:t>10/8/2023</a:t>
             </a:fld>
             <a:endParaRPr lang="en-US"/>
           </a:p>
@@ -2903,7 +2903,7 @@
           <a:p>
             <a:fld id="{1E351CED-465B-40B5-ADCE-957C918F227B}" type="datetimeFigureOut">
               <a:rPr lang="en-US" smtClean="0"/>
-              <a:t>9/14/2023</a:t>
+              <a:t>10/8/2023</a:t>
             </a:fld>
             <a:endParaRPr lang="en-US"/>
           </a:p>
@@ -3197,7 +3197,7 @@
           <a:p>
             <a:fld id="{1E351CED-465B-40B5-ADCE-957C918F227B}" type="datetimeFigureOut">
               <a:rPr lang="en-US" smtClean="0"/>
-              <a:t>9/14/2023</a:t>
+              <a:t>10/8/2023</a:t>
             </a:fld>
             <a:endParaRPr lang="en-US"/>
           </a:p>
@@ -3438,7 +3438,7 @@
           <a:p>
             <a:fld id="{1E351CED-465B-40B5-ADCE-957C918F227B}" type="datetimeFigureOut">
               <a:rPr lang="en-US" smtClean="0"/>
-              <a:t>9/14/2023</a:t>
+              <a:t>10/8/2023</a:t>
             </a:fld>
             <a:endParaRPr lang="en-US"/>
           </a:p>
@@ -3867,7 +3867,7 @@
                 <a16:creationId xmlns:a16="http://schemas.microsoft.com/office/drawing/2014/main" id="{789EBE4E-5983-B393-1D5E-731351065799}"/>
               </a:ext>
               <a:ext uri="{C183D7F6-B498-43B3-948B-1728B52AA6E4}">
-                <adec:decorative xmlns:adec="http://schemas.microsoft.com/office/drawing/2017/decorative" val="1"/>
+                <adec:decorative xmlns:adec="http://schemas.microsoft.com/office/drawing/2017/decorative" xmlns="" val="1"/>
               </a:ext>
             </a:extLst>
           </p:cNvPr>
@@ -3975,7 +3975,7 @@
                 <a16:creationId xmlns:a16="http://schemas.microsoft.com/office/drawing/2014/main" id="{2CEF5482-568A-9463-C672-BC6D644DF982}"/>
               </a:ext>
               <a:ext uri="{C183D7F6-B498-43B3-948B-1728B52AA6E4}">
-                <adec:decorative xmlns:adec="http://schemas.microsoft.com/office/drawing/2017/decorative" val="1"/>
+                <adec:decorative xmlns:adec="http://schemas.microsoft.com/office/drawing/2017/decorative" xmlns="" val="1"/>
               </a:ext>
             </a:extLst>
           </p:cNvPr>
@@ -4192,7 +4192,7 @@
                 <a16:creationId xmlns:a16="http://schemas.microsoft.com/office/drawing/2014/main" id="{D38784C3-11AE-0BE2-6339-1A2BDAC7F034}"/>
               </a:ext>
               <a:ext uri="{C183D7F6-B498-43B3-948B-1728B52AA6E4}">
-                <adec:decorative xmlns:adec="http://schemas.microsoft.com/office/drawing/2017/decorative" val="1"/>
+                <adec:decorative xmlns:adec="http://schemas.microsoft.com/office/drawing/2017/decorative" xmlns="" val="1"/>
               </a:ext>
             </a:extLst>
           </p:cNvPr>
@@ -4840,10 +4840,10 @@
       </p:sp>
       <p:pic>
         <p:nvPicPr>
-          <p:cNvPr id="5" name="Picture 4">
-            <a:extLst>
-              <a:ext uri="{FF2B5EF4-FFF2-40B4-BE49-F238E27FC236}">
-                <a16:creationId xmlns:a16="http://schemas.microsoft.com/office/drawing/2014/main" id="{C16A86F6-6357-0649-6F7F-76961E21D4E4}"/>
+          <p:cNvPr id="6" name="Picture 5" descr="codeopinion.com/wp-content/uploads/2017/10/Bitm...">
+            <a:extLst>
+              <a:ext uri="{FF2B5EF4-FFF2-40B4-BE49-F238E27FC236}">
+                <a16:creationId xmlns:a16="http://schemas.microsoft.com/office/drawing/2014/main" id="{4AAFD4D1-CD34-9D29-E030-092492E316BE}"/>
               </a:ext>
             </a:extLst>
           </p:cNvPr>
@@ -4860,8 +4860,8 @@
         </p:blipFill>
         <p:spPr>
           <a:xfrm>
-            <a:off x="1043188" y="2574222"/>
-            <a:ext cx="2743199" cy="1022684"/>
+            <a:off x="5866137" y="2131422"/>
+            <a:ext cx="2002665" cy="2002665"/>
           </a:xfrm>
           <a:prstGeom prst="rect">
             <a:avLst/>
@@ -4870,10 +4870,10 @@
       </p:pic>
       <p:pic>
         <p:nvPicPr>
-          <p:cNvPr id="6" name="Picture 5" descr="codeopinion.com/wp-content/uploads/2017/10/Bitm...">
-            <a:extLst>
-              <a:ext uri="{FF2B5EF4-FFF2-40B4-BE49-F238E27FC236}">
-                <a16:creationId xmlns:a16="http://schemas.microsoft.com/office/drawing/2014/main" id="{4AAFD4D1-CD34-9D29-E030-092492E316BE}"/>
+          <p:cNvPr id="8" name="Picture 7" descr="net">
+            <a:extLst>
+              <a:ext uri="{FF2B5EF4-FFF2-40B4-BE49-F238E27FC236}">
+                <a16:creationId xmlns:a16="http://schemas.microsoft.com/office/drawing/2014/main" id="{603EFB63-FB0C-0376-0431-FDE5D36B94E4}"/>
               </a:ext>
             </a:extLst>
           </p:cNvPr>
@@ -4890,8 +4890,8 @@
         </p:blipFill>
         <p:spPr>
           <a:xfrm>
-            <a:off x="5866137" y="2131422"/>
-            <a:ext cx="2002665" cy="2002665"/>
+            <a:off x="3490175" y="4128752"/>
+            <a:ext cx="2034862" cy="2034862"/>
           </a:xfrm>
           <a:prstGeom prst="rect">
             <a:avLst/>
@@ -4900,10 +4900,10 @@
       </p:pic>
       <p:pic>
         <p:nvPicPr>
-          <p:cNvPr id="8" name="Picture 7" descr="net">
-            <a:extLst>
-              <a:ext uri="{FF2B5EF4-FFF2-40B4-BE49-F238E27FC236}">
-                <a16:creationId xmlns:a16="http://schemas.microsoft.com/office/drawing/2014/main" id="{603EFB63-FB0C-0376-0431-FDE5D36B94E4}"/>
+          <p:cNvPr id="10" name="Picture 9" descr="C# | Викии Вики | Fandom">
+            <a:extLst>
+              <a:ext uri="{FF2B5EF4-FFF2-40B4-BE49-F238E27FC236}">
+                <a16:creationId xmlns:a16="http://schemas.microsoft.com/office/drawing/2014/main" id="{1E5C7350-F0EB-5638-7692-B93A2B557687}"/>
               </a:ext>
             </a:extLst>
           </p:cNvPr>
@@ -4920,8 +4920,8 @@
         </p:blipFill>
         <p:spPr>
           <a:xfrm>
-            <a:off x="3490175" y="4128752"/>
-            <a:ext cx="2034862" cy="2034862"/>
+            <a:off x="8907885" y="756632"/>
+            <a:ext cx="1524003" cy="1524003"/>
           </a:xfrm>
           <a:prstGeom prst="rect">
             <a:avLst/>
@@ -4930,32 +4930,41 @@
       </p:pic>
       <p:pic>
         <p:nvPicPr>
-          <p:cNvPr id="10" name="Picture 9" descr="C# | Викии Вики | Fandom">
-            <a:extLst>
-              <a:ext uri="{FF2B5EF4-FFF2-40B4-BE49-F238E27FC236}">
-                <a16:creationId xmlns:a16="http://schemas.microsoft.com/office/drawing/2014/main" id="{1E5C7350-F0EB-5638-7692-B93A2B557687}"/>
-              </a:ext>
-            </a:extLst>
-          </p:cNvPr>
+          <p:cNvPr id="1026" name="Picture 2" descr="Digitteck | WPF"/>
           <p:cNvPicPr>
-            <a:picLocks noChangeAspect="1"/>
+            <a:picLocks noChangeAspect="1" noChangeArrowheads="1"/>
           </p:cNvPicPr>
           <p:nvPr/>
         </p:nvPicPr>
-        <p:blipFill>
-          <a:blip r:embed="rId5"/>
-          <a:stretch>
-            <a:fillRect/>
-          </a:stretch>
+        <p:blipFill rotWithShape="1">
+          <a:blip r:embed="rId5">
+            <a:extLst>
+              <a:ext uri="{28A0092B-C50C-407E-A947-70E740481C1C}">
+                <a14:useLocalDpi xmlns:a14="http://schemas.microsoft.com/office/drawing/2010/main" val="0"/>
+              </a:ext>
+            </a:extLst>
+          </a:blip>
+          <a:srcRect l="14732" t="20279" r="13671" b="39856"/>
+          <a:stretch/>
         </p:blipFill>
-        <p:spPr>
+        <p:spPr bwMode="auto">
           <a:xfrm>
-            <a:off x="8907885" y="756632"/>
-            <a:ext cx="1524003" cy="1524003"/>
+            <a:off x="490194" y="2280635"/>
+            <a:ext cx="4507592" cy="1423449"/>
           </a:xfrm>
           <a:prstGeom prst="rect">
             <a:avLst/>
           </a:prstGeom>
+          <a:noFill/>
+          <a:extLst>
+            <a:ext uri="{909E8E84-426E-40DD-AFC4-6F175D3DCCD1}">
+              <a14:hiddenFill xmlns:a14="http://schemas.microsoft.com/office/drawing/2010/main">
+                <a:solidFill>
+                  <a:srgbClr val="FFFFFF"/>
+                </a:solidFill>
+              </a14:hiddenFill>
+            </a:ext>
+          </a:extLst>
         </p:spPr>
       </p:pic>
     </p:spTree>

</xml_diff>